<commit_message>
New calendar schedule and updated ppt materials.
</commit_message>
<xml_diff>
--- a/notes/1_Offensive_Vocabulary.pptx
+++ b/notes/1_Offensive_Vocabulary.pptx
@@ -619,13 +619,58 @@
           </a:bodyPr>
           <a:lstStyle/>
           <a:p>
-            <a:pPr lvl="0">
-              <a:spcBef>
-                <a:spcPts val="0"/>
-              </a:spcBef>
-              <a:buNone/>
-            </a:pPr>
-            <a:endParaRPr/>
+            <a:pPr marL="171450" lvl="0" indent="-171450">
+              <a:spcBef>
+                <a:spcPts val="0"/>
+              </a:spcBef>
+              <a:buFont typeface="Arial" panose="020B0604020202020204" pitchFamily="34" charset="0"/>
+              <a:buChar char="•"/>
+            </a:pPr>
+            <a:r>
+              <a:rPr lang="en-US" sz="1100" b="0" i="0" u="none" strike="noStrike" kern="1200" cap="none" dirty="0">
+                <a:solidFill>
+                  <a:schemeClr val="dk1"/>
+                </a:solidFill>
+                <a:effectLst/>
+                <a:latin typeface="Arial"/>
+                <a:ea typeface="Arial"/>
+                <a:cs typeface="Arial"/>
+                <a:sym typeface="Arial"/>
+                <a:hlinkClick r:id="rId3"/>
+              </a:rPr>
+              <a:t>Pi-hole</a:t>
+            </a:r>
+            <a:r>
+              <a:rPr lang="en-US" sz="1100" b="0" i="0" u="none" strike="noStrike" kern="1200" cap="none" dirty="0">
+                <a:solidFill>
+                  <a:schemeClr val="dk1"/>
+                </a:solidFill>
+                <a:effectLst/>
+                <a:latin typeface="Arial"/>
+                <a:ea typeface="Arial"/>
+                <a:cs typeface="Arial"/>
+                <a:sym typeface="Arial"/>
+              </a:rPr>
+              <a:t>, often implemented on a Raspberry Pi or Linux system, is </a:t>
+            </a:r>
+            <a:r>
+              <a:rPr lang="en-US" dirty="0"/>
+              <a:t>a network-wide ad and tracker blocker</a:t>
+            </a:r>
+            <a:r>
+              <a:rPr lang="en-US" sz="1100" b="0" i="0" u="none" strike="noStrike" kern="1200" cap="none" dirty="0">
+                <a:solidFill>
+                  <a:schemeClr val="dk1"/>
+                </a:solidFill>
+                <a:effectLst/>
+                <a:latin typeface="Arial"/>
+                <a:ea typeface="Arial"/>
+                <a:cs typeface="Arial"/>
+                <a:sym typeface="Arial"/>
+              </a:rPr>
+              <a:t> that works as a DNS sinkhole, preventing unwanted content from reaching any device on your network without installing software on each one, protecting smart TVs, phones, and computers by blocking ads and trackers at the DNS level before they load. It acts as a private DNS server, filtering out requests to known ad/tracker domains, improving privacy and potentially network speed, and offers a web interface for monitoring blocked requests. </a:t>
+            </a:r>
+            <a:endParaRPr dirty="0"/>
           </a:p>
         </p:txBody>
       </p:sp>
@@ -886,31 +931,7 @@
               <a:buSzPct val="25000"/>
               <a:buNone/>
             </a:pPr>
-            <a:r>
-              <a:rPr lang="en-US" sz="1100" b="0" i="0" u="none" strike="noStrike" cap="none">
-                <a:solidFill>
-                  <a:schemeClr val="dk1"/>
-                </a:solidFill>
-                <a:latin typeface="Arial"/>
-                <a:ea typeface="Arial"/>
-                <a:cs typeface="Arial"/>
-                <a:sym typeface="Arial"/>
-              </a:rPr>
-              <a:t>The OWASP Top 10 Attacks was last updated in 2013 and is in the process of being updated this year.  A list of the full top 10 attacks can be downloaded at https://www.owasp.org/index.php/Top_10_2013-Top_10. </a:t>
-            </a:r>
-          </a:p>
-          <a:p>
-            <a:pPr marL="0" marR="0" lvl="0" indent="0" algn="l" rtl="0">
-              <a:spcBef>
-                <a:spcPts val="0"/>
-              </a:spcBef>
-              <a:spcAft>
-                <a:spcPts val="0"/>
-              </a:spcAft>
-              <a:buSzPct val="25000"/>
-              <a:buNone/>
-            </a:pPr>
-            <a:endParaRPr sz="1100" b="0" i="0" u="none" strike="noStrike" cap="none">
+            <a:endParaRPr sz="1100" b="0" i="0" u="none" strike="noStrike" cap="none" dirty="0">
               <a:solidFill>
                 <a:schemeClr val="dk1"/>
               </a:solidFill>
@@ -919,27 +940,6 @@
               <a:cs typeface="Arial"/>
               <a:sym typeface="Arial"/>
             </a:endParaRPr>
-          </a:p>
-          <a:p>
-            <a:pPr marL="0" marR="0" lvl="0" indent="0" algn="l" rtl="0">
-              <a:spcBef>
-                <a:spcPts val="0"/>
-              </a:spcBef>
-              <a:buSzPct val="25000"/>
-              <a:buNone/>
-            </a:pPr>
-            <a:r>
-              <a:rPr lang="en-US" sz="1100" b="1" i="1" u="none" strike="noStrike" cap="none">
-                <a:solidFill>
-                  <a:schemeClr val="dk1"/>
-                </a:solidFill>
-                <a:latin typeface="Arial"/>
-                <a:ea typeface="Arial"/>
-                <a:cs typeface="Arial"/>
-                <a:sym typeface="Arial"/>
-              </a:rPr>
-              <a:t>Labs have been provided in this module to demonstrate how these attacks are implemented.</a:t>
-            </a:r>
           </a:p>
         </p:txBody>
       </p:sp>
@@ -1048,25 +1048,15 @@
           </a:bodyPr>
           <a:lstStyle/>
           <a:p>
-            <a:pPr marL="0" marR="0" lvl="0" indent="0" algn="l" rtl="0">
-              <a:spcBef>
-                <a:spcPts val="0"/>
-              </a:spcBef>
-              <a:buSzPct val="25000"/>
-              <a:buNone/>
-            </a:pPr>
-            <a:r>
-              <a:rPr lang="en-US" sz="1100" b="0" i="0" u="none" strike="noStrike" cap="none">
-                <a:solidFill>
-                  <a:schemeClr val="dk1"/>
-                </a:solidFill>
-                <a:latin typeface="Arial"/>
-                <a:ea typeface="Arial"/>
-                <a:cs typeface="Arial"/>
-                <a:sym typeface="Arial"/>
-              </a:rPr>
-              <a:t> </a:t>
-            </a:r>
+            <a:endParaRPr lang="en-US" sz="1100" b="0" i="0" u="none" strike="noStrike" cap="none" dirty="0">
+              <a:solidFill>
+                <a:schemeClr val="dk1"/>
+              </a:solidFill>
+              <a:latin typeface="Arial"/>
+              <a:ea typeface="Arial"/>
+              <a:cs typeface="Arial"/>
+              <a:sym typeface="Arial"/>
+            </a:endParaRPr>
           </a:p>
         </p:txBody>
       </p:sp>
@@ -1120,13 +1110,334 @@
           </a:bodyPr>
           <a:lstStyle/>
           <a:p>
+            <a:r>
+              <a:rPr lang="en-US" sz="1100" b="0" i="0" u="none" strike="noStrike" cap="none" dirty="0">
+                <a:solidFill>
+                  <a:schemeClr val="dk1"/>
+                </a:solidFill>
+                <a:latin typeface="Arial"/>
+                <a:ea typeface="Arial"/>
+                <a:cs typeface="Arial"/>
+                <a:sym typeface="Arial"/>
+              </a:rPr>
+              <a:t> </a:t>
+            </a:r>
+            <a:r>
+              <a:rPr lang="en-US" sz="1100" b="0" i="0" u="none" strike="noStrike" kern="1200" cap="none" dirty="0">
+                <a:solidFill>
+                  <a:schemeClr val="dk1"/>
+                </a:solidFill>
+                <a:effectLst/>
+                <a:latin typeface="Arial"/>
+                <a:ea typeface="Arial"/>
+                <a:cs typeface="Arial"/>
+                <a:sym typeface="Arial"/>
+              </a:rPr>
+              <a:t>Over the years, SQL injection has been responsible for some of the most significant data breaches and cyber-attacks. Below are just two examples from the SQL Injection Wikipedia page:</a:t>
+            </a:r>
+          </a:p>
+          <a:p>
+            <a:endParaRPr lang="en-US" sz="1100" b="0" i="0" u="none" strike="noStrike" kern="1200" cap="none" dirty="0">
+              <a:solidFill>
+                <a:schemeClr val="dk1"/>
+              </a:solidFill>
+              <a:effectLst/>
+              <a:latin typeface="Arial"/>
+              <a:ea typeface="Arial"/>
+              <a:cs typeface="Arial"/>
+              <a:sym typeface="Arial"/>
+            </a:endParaRPr>
+          </a:p>
+          <a:p>
+            <a:pPr marL="0" marR="0" lvl="0" indent="0" algn="l" rtl="0">
+              <a:spcBef>
+                <a:spcPts val="0"/>
+              </a:spcBef>
+              <a:buSzPct val="25000"/>
+              <a:buNone/>
+            </a:pPr>
+            <a:r>
+              <a:rPr lang="en-US" sz="1100" b="0" i="0" u="none" strike="noStrike" cap="none" dirty="0">
+                <a:solidFill>
+                  <a:schemeClr val="dk1"/>
+                </a:solidFill>
+                <a:latin typeface="Arial"/>
+                <a:ea typeface="Arial"/>
+                <a:cs typeface="Arial"/>
+                <a:sym typeface="Arial"/>
+              </a:rPr>
+              <a:t>In 2024, a pair of security researchers discovered an SQL injection vulnerability in the </a:t>
+            </a:r>
+            <a:r>
+              <a:rPr lang="en-US" sz="1100" b="0" i="0" u="none" strike="noStrike" cap="none" dirty="0" err="1">
+                <a:solidFill>
+                  <a:schemeClr val="dk1"/>
+                </a:solidFill>
+                <a:latin typeface="Arial"/>
+                <a:ea typeface="Arial"/>
+                <a:cs typeface="Arial"/>
+                <a:sym typeface="Arial"/>
+              </a:rPr>
+              <a:t>FlyCASS</a:t>
+            </a:r>
+            <a:r>
+              <a:rPr lang="en-US" sz="1100" b="0" i="0" u="none" strike="noStrike" cap="none" dirty="0">
+                <a:solidFill>
+                  <a:schemeClr val="dk1"/>
+                </a:solidFill>
+                <a:latin typeface="Arial"/>
+                <a:ea typeface="Arial"/>
+                <a:cs typeface="Arial"/>
+                <a:sym typeface="Arial"/>
+              </a:rPr>
+              <a:t> system, used by the Transportation Security Administration (TSA) to verify airline crew members. Exploiting this flaw provided unauthorized administrative access, potentially allowing the addition of false crew records.</a:t>
+            </a:r>
+          </a:p>
+          <a:p>
+            <a:pPr marL="0" marR="0" lvl="0" indent="0" algn="l" rtl="0">
+              <a:spcBef>
+                <a:spcPts val="0"/>
+              </a:spcBef>
+              <a:buSzPct val="25000"/>
+              <a:buNone/>
+            </a:pPr>
+            <a:endParaRPr lang="en-US" sz="1100" b="0" i="0" u="none" strike="noStrike" cap="none" dirty="0">
+              <a:solidFill>
+                <a:schemeClr val="dk1"/>
+              </a:solidFill>
+              <a:latin typeface="Arial"/>
+              <a:ea typeface="Arial"/>
+              <a:cs typeface="Arial"/>
+              <a:sym typeface="Arial"/>
+            </a:endParaRPr>
+          </a:p>
+          <a:p>
+            <a:pPr marL="0" marR="0" lvl="0" indent="0" algn="l" rtl="0">
+              <a:spcBef>
+                <a:spcPts val="0"/>
+              </a:spcBef>
+              <a:buSzPct val="25000"/>
+              <a:buNone/>
+            </a:pPr>
+            <a:r>
+              <a:rPr lang="en-US" sz="1100" b="0" i="0" u="none" strike="noStrike" kern="1200" cap="none" dirty="0">
+                <a:solidFill>
+                  <a:schemeClr val="dk1"/>
+                </a:solidFill>
+                <a:effectLst/>
+                <a:latin typeface="Arial"/>
+                <a:ea typeface="Arial"/>
+                <a:cs typeface="Arial"/>
+                <a:sym typeface="Arial"/>
+              </a:rPr>
+              <a:t>In 2023, a widespread SQL injection attack targeted </a:t>
+            </a:r>
+            <a:r>
+              <a:rPr lang="en-US" sz="1100" b="0" i="0" u="none" strike="noStrike" kern="1200" cap="none" dirty="0" err="1">
+                <a:solidFill>
+                  <a:schemeClr val="dk1"/>
+                </a:solidFill>
+                <a:effectLst/>
+                <a:latin typeface="Arial"/>
+                <a:ea typeface="Arial"/>
+                <a:cs typeface="Arial"/>
+                <a:sym typeface="Arial"/>
+                <a:hlinkClick r:id="rId3" tooltip="MOVEit"/>
+              </a:rPr>
+              <a:t>MOVEit</a:t>
+            </a:r>
+            <a:r>
+              <a:rPr lang="en-US" sz="1100" b="0" i="0" u="none" strike="noStrike" kern="1200" cap="none" dirty="0">
+                <a:solidFill>
+                  <a:schemeClr val="dk1"/>
+                </a:solidFill>
+                <a:effectLst/>
+                <a:latin typeface="Arial"/>
+                <a:ea typeface="Arial"/>
+                <a:cs typeface="Arial"/>
+                <a:sym typeface="Arial"/>
+              </a:rPr>
+              <a:t>, a widely used </a:t>
+            </a:r>
+            <a:r>
+              <a:rPr lang="en-US" sz="1100" b="0" i="0" u="none" strike="noStrike" kern="1200" cap="none" dirty="0">
+                <a:solidFill>
+                  <a:schemeClr val="dk1"/>
+                </a:solidFill>
+                <a:effectLst/>
+                <a:latin typeface="Arial"/>
+                <a:ea typeface="Arial"/>
+                <a:cs typeface="Arial"/>
+                <a:sym typeface="Arial"/>
+                <a:hlinkClick r:id="rId4" tooltip="File transfer service"/>
+              </a:rPr>
+              <a:t>file-transfer service</a:t>
+            </a:r>
+            <a:r>
+              <a:rPr lang="en-US" sz="1100" b="0" i="0" u="none" strike="noStrike" kern="1200" cap="none" dirty="0">
+                <a:solidFill>
+                  <a:schemeClr val="dk1"/>
+                </a:solidFill>
+                <a:effectLst/>
+                <a:latin typeface="Arial"/>
+                <a:ea typeface="Arial"/>
+                <a:cs typeface="Arial"/>
+                <a:sym typeface="Arial"/>
+              </a:rPr>
+              <a:t>. The attacks, attributed to the Russian-speaking cybercrime group </a:t>
+            </a:r>
+            <a:r>
+              <a:rPr lang="en-US" sz="1100" b="0" i="0" u="none" strike="noStrike" kern="1200" cap="none" dirty="0">
+                <a:solidFill>
+                  <a:schemeClr val="dk1"/>
+                </a:solidFill>
+                <a:effectLst/>
+                <a:latin typeface="Arial"/>
+                <a:ea typeface="Arial"/>
+                <a:cs typeface="Arial"/>
+                <a:sym typeface="Arial"/>
+                <a:hlinkClick r:id="rId5" tooltip="Clop (cyber gang)"/>
+              </a:rPr>
+              <a:t>Clop</a:t>
+            </a:r>
+            <a:r>
+              <a:rPr lang="en-US" sz="1100" b="0" i="0" u="none" strike="noStrike" kern="1200" cap="none" dirty="0">
+                <a:solidFill>
+                  <a:schemeClr val="dk1"/>
+                </a:solidFill>
+                <a:effectLst/>
+                <a:latin typeface="Arial"/>
+                <a:ea typeface="Arial"/>
+                <a:cs typeface="Arial"/>
+                <a:sym typeface="Arial"/>
+              </a:rPr>
+              <a:t>, compromised multiple global organizations, including payroll provider </a:t>
+            </a:r>
+            <a:r>
+              <a:rPr lang="en-US" sz="1100" b="0" i="0" u="none" strike="noStrike" kern="1200" cap="none" dirty="0" err="1">
+                <a:solidFill>
+                  <a:schemeClr val="dk1"/>
+                </a:solidFill>
+                <a:effectLst/>
+                <a:latin typeface="Arial"/>
+                <a:ea typeface="Arial"/>
+                <a:cs typeface="Arial"/>
+                <a:sym typeface="Arial"/>
+              </a:rPr>
+              <a:t>Zellis</a:t>
+            </a:r>
+            <a:r>
+              <a:rPr lang="en-US" sz="1100" b="0" i="0" u="none" strike="noStrike" kern="1200" cap="none" dirty="0">
+                <a:solidFill>
+                  <a:schemeClr val="dk1"/>
+                </a:solidFill>
+                <a:effectLst/>
+                <a:latin typeface="Arial"/>
+                <a:ea typeface="Arial"/>
+                <a:cs typeface="Arial"/>
+                <a:sym typeface="Arial"/>
+              </a:rPr>
+              <a:t>, </a:t>
+            </a:r>
+            <a:r>
+              <a:rPr lang="en-US" sz="1100" b="0" i="0" u="none" strike="noStrike" kern="1200" cap="none" dirty="0">
+                <a:solidFill>
+                  <a:schemeClr val="dk1"/>
+                </a:solidFill>
+                <a:effectLst/>
+                <a:latin typeface="Arial"/>
+                <a:ea typeface="Arial"/>
+                <a:cs typeface="Arial"/>
+                <a:sym typeface="Arial"/>
+                <a:hlinkClick r:id="rId6" tooltip="British Airways"/>
+              </a:rPr>
+              <a:t>British Airways</a:t>
+            </a:r>
+            <a:r>
+              <a:rPr lang="en-US" sz="1100" b="0" i="0" u="none" strike="noStrike" kern="1200" cap="none" dirty="0">
+                <a:solidFill>
+                  <a:schemeClr val="dk1"/>
+                </a:solidFill>
+                <a:effectLst/>
+                <a:latin typeface="Arial"/>
+                <a:ea typeface="Arial"/>
+                <a:cs typeface="Arial"/>
+                <a:sym typeface="Arial"/>
+              </a:rPr>
+              <a:t>, the </a:t>
+            </a:r>
+            <a:r>
+              <a:rPr lang="en-US" sz="1100" b="0" i="0" u="none" strike="noStrike" kern="1200" cap="none" dirty="0">
+                <a:solidFill>
+                  <a:schemeClr val="dk1"/>
+                </a:solidFill>
+                <a:effectLst/>
+                <a:latin typeface="Arial"/>
+                <a:ea typeface="Arial"/>
+                <a:cs typeface="Arial"/>
+                <a:sym typeface="Arial"/>
+                <a:hlinkClick r:id="rId7" tooltip="BBC"/>
+              </a:rPr>
+              <a:t>BBC</a:t>
+            </a:r>
+            <a:r>
+              <a:rPr lang="en-US" sz="1100" b="0" i="0" u="none" strike="noStrike" kern="1200" cap="none" dirty="0">
+                <a:solidFill>
+                  <a:schemeClr val="dk1"/>
+                </a:solidFill>
+                <a:effectLst/>
+                <a:latin typeface="Arial"/>
+                <a:ea typeface="Arial"/>
+                <a:cs typeface="Arial"/>
+                <a:sym typeface="Arial"/>
+              </a:rPr>
+              <a:t>, and UK retailer </a:t>
+            </a:r>
+            <a:r>
+              <a:rPr lang="en-US" sz="1100" b="0" i="0" u="none" strike="noStrike" kern="1200" cap="none" dirty="0">
+                <a:solidFill>
+                  <a:schemeClr val="dk1"/>
+                </a:solidFill>
+                <a:effectLst/>
+                <a:latin typeface="Arial"/>
+                <a:ea typeface="Arial"/>
+                <a:cs typeface="Arial"/>
+                <a:sym typeface="Arial"/>
+                <a:hlinkClick r:id="rId8" tooltip="Boots (company)"/>
+              </a:rPr>
+              <a:t>Boots</a:t>
+            </a:r>
+            <a:r>
+              <a:rPr lang="en-US" sz="1100" b="0" i="0" u="none" strike="noStrike" kern="1200" cap="none" dirty="0">
+                <a:solidFill>
+                  <a:schemeClr val="dk1"/>
+                </a:solidFill>
+                <a:effectLst/>
+                <a:latin typeface="Arial"/>
+                <a:ea typeface="Arial"/>
+                <a:cs typeface="Arial"/>
+                <a:sym typeface="Arial"/>
+              </a:rPr>
+              <a:t>.</a:t>
+            </a:r>
+            <a:endParaRPr lang="en-US" sz="1100" b="0" i="0" u="none" strike="noStrike" cap="none" dirty="0">
+              <a:solidFill>
+                <a:schemeClr val="dk1"/>
+              </a:solidFill>
+              <a:latin typeface="Arial"/>
+              <a:ea typeface="Arial"/>
+              <a:cs typeface="Arial"/>
+              <a:sym typeface="Arial"/>
+            </a:endParaRPr>
+          </a:p>
+          <a:p>
             <a:pPr lvl="0">
               <a:spcBef>
                 <a:spcPts val="0"/>
               </a:spcBef>
               <a:buNone/>
             </a:pPr>
-            <a:endParaRPr/>
+            <a:endParaRPr dirty="0"/>
           </a:p>
         </p:txBody>
       </p:sp>
@@ -6132,7 +6443,7 @@
               <a:buChar char="•"/>
             </a:pPr>
             <a:r>
-              <a:rPr lang="en-US" sz="2400" b="0" i="0" u="none" strike="noStrike" cap="none">
+              <a:rPr lang="en-US" sz="2400" b="0" i="0" u="none" strike="noStrike" cap="none" dirty="0">
                 <a:solidFill>
                   <a:srgbClr val="2955A6"/>
                 </a:solidFill>
@@ -6160,7 +6471,7 @@
               <a:buChar char="•"/>
             </a:pPr>
             <a:r>
-              <a:rPr lang="en-US" sz="2400" b="0" i="0" u="none" strike="noStrike" cap="none">
+              <a:rPr lang="en-US" sz="2400" b="0" i="0" u="none" strike="noStrike" cap="none" dirty="0">
                 <a:solidFill>
                   <a:srgbClr val="2955A6"/>
                 </a:solidFill>
@@ -6169,7 +6480,7 @@
                 <a:cs typeface="Calibri"/>
                 <a:sym typeface="Calibri"/>
               </a:rPr>
-              <a:t>Disable pop-up blockers and ActiveX controls in the untrusted, Internet zone.</a:t>
+              <a:t>Enable pop-up blockers.</a:t>
             </a:r>
           </a:p>
           <a:p>
@@ -6188,7 +6499,7 @@
               <a:buChar char="•"/>
             </a:pPr>
             <a:r>
-              <a:rPr lang="en-US" sz="2400" b="0" i="0" u="none" strike="noStrike" cap="none">
+              <a:rPr lang="en-US" sz="2400" b="0" i="0" u="none" strike="noStrike" cap="none" dirty="0">
                 <a:solidFill>
                   <a:srgbClr val="2955A6"/>
                 </a:solidFill>
@@ -6213,7 +6524,7 @@
               <a:buChar char="•"/>
             </a:pPr>
             <a:r>
-              <a:rPr lang="en-US" sz="2400" b="0" i="0" u="none" strike="noStrike" cap="none">
+              <a:rPr lang="en-US" sz="2400" b="0" i="0" u="none" strike="noStrike" cap="none" dirty="0">
                 <a:solidFill>
                   <a:srgbClr val="2955A6"/>
                 </a:solidFill>
@@ -6223,6 +6534,31 @@
                 <a:sym typeface="Calibri"/>
               </a:rPr>
               <a:t>Encrypt all sensitive data on the drive.</a:t>
+            </a:r>
+          </a:p>
+          <a:p>
+            <a:pPr marL="342900" marR="0" lvl="0" indent="-342900" algn="l" rtl="0">
+              <a:spcBef>
+                <a:spcPts val="480"/>
+              </a:spcBef>
+              <a:buClr>
+                <a:srgbClr val="2955A6"/>
+              </a:buClr>
+              <a:buSzPct val="100000"/>
+              <a:buFont typeface="Arial"/>
+              <a:buChar char="•"/>
+            </a:pPr>
+            <a:r>
+              <a:rPr lang="en-US" sz="2400" b="0" i="0" u="none" strike="noStrike" cap="none" dirty="0">
+                <a:solidFill>
+                  <a:srgbClr val="2955A6"/>
+                </a:solidFill>
+                <a:latin typeface="Calibri"/>
+                <a:ea typeface="Calibri"/>
+                <a:cs typeface="Calibri"/>
+                <a:sym typeface="Calibri"/>
+              </a:rPr>
+              <a:t>Provide education for end users on identifying suspicious emails and other social engineering attacks.</a:t>
             </a:r>
           </a:p>
         </p:txBody>
@@ -6738,7 +7074,7 @@
               <a:buChar char="•"/>
             </a:pPr>
             <a:r>
-              <a:rPr lang="en-US" sz="2400" b="0" i="0" u="none" strike="noStrike" cap="none">
+              <a:rPr lang="en-US" sz="2400" b="0" i="0" u="none" strike="noStrike" cap="none" dirty="0">
                 <a:solidFill>
                   <a:srgbClr val="2955A6"/>
                 </a:solidFill>
@@ -6747,7 +7083,7 @@
                 <a:cs typeface="Calibri"/>
                 <a:sym typeface="Calibri"/>
               </a:rPr>
-              <a:t>Injection attacks occur when applications provide for untrusted input from a user, through a web application interface to a database, for example, as with SQL and LDAP Injections, allowing the attacker to send commands that are executed at the database server, providing the attacker with access or the ability to delete/modify information.</a:t>
+              <a:t>Injection attacks occur when applications provide for untrusted input from a user, through a web application interface to a database, allowing the attacker to send commands that are executed at the database server, providing the attacker with access or the ability to delete/modify information.</a:t>
             </a:r>
           </a:p>
           <a:p>
@@ -6763,7 +7099,7 @@
               <a:buChar char="•"/>
             </a:pPr>
             <a:r>
-              <a:rPr lang="en-US" sz="2400" b="0" i="0" u="none" strike="noStrike" cap="none">
+              <a:rPr lang="en-US" sz="2400" b="0" i="0" u="none" strike="noStrike" cap="none" dirty="0">
                 <a:solidFill>
                   <a:srgbClr val="2955A6"/>
                 </a:solidFill>
@@ -6772,7 +7108,7 @@
                 <a:cs typeface="Calibri"/>
                 <a:sym typeface="Calibri"/>
               </a:rPr>
-              <a:t>The most common of these attacks is SQL Injection.  In 2014, a Russian criminal group known as “CyberVor” attack U.S. businesses and collection over a billion usernames and passwords using SQL Injection.</a:t>
+              <a:t>The most common of these attacks is SQL Injection</a:t>
             </a:r>
           </a:p>
         </p:txBody>
@@ -8200,7 +8536,7 @@
               <a:buChar char="•"/>
             </a:pPr>
             <a:r>
-              <a:rPr lang="en-US" sz="2400" b="0" i="0" u="none" strike="noStrike" cap="none">
+              <a:rPr lang="en-US" sz="2400" b="1" i="0" u="none" strike="noStrike" cap="none" dirty="0" err="1">
                 <a:solidFill>
                   <a:srgbClr val="2955A6"/>
                 </a:solidFill>
@@ -8209,7 +8545,19 @@
                 <a:cs typeface="Calibri"/>
                 <a:sym typeface="Calibri"/>
               </a:rPr>
-              <a:t>Spearphishing – target phishing attacks. As an example, spoofing emails as coming from a college IT Help Desk to students and faculty.</a:t>
+              <a:t>Spearphishing</a:t>
+            </a:r>
+            <a:r>
+              <a:rPr lang="en-US" sz="2400" b="0" i="0" u="none" strike="noStrike" cap="none" dirty="0">
+                <a:solidFill>
+                  <a:srgbClr val="2955A6"/>
+                </a:solidFill>
+                <a:latin typeface="Calibri"/>
+                <a:ea typeface="Calibri"/>
+                <a:cs typeface="Calibri"/>
+                <a:sym typeface="Calibri"/>
+              </a:rPr>
+              <a:t> – target phishing attacks. As an example, spoofing emails as coming from a college IT Help Desk to students and faculty.</a:t>
             </a:r>
           </a:p>
           <a:p>
@@ -8228,7 +8576,7 @@
               <a:buChar char="•"/>
             </a:pPr>
             <a:r>
-              <a:rPr lang="en-US" sz="2400" b="0" i="0" u="none" strike="noStrike" cap="none">
+              <a:rPr lang="en-US" sz="2400" b="1" i="0" u="none" strike="noStrike" cap="none" dirty="0">
                 <a:solidFill>
                   <a:srgbClr val="2955A6"/>
                 </a:solidFill>
@@ -8237,7 +8585,19 @@
                 <a:cs typeface="Calibri"/>
                 <a:sym typeface="Calibri"/>
               </a:rPr>
-              <a:t>Whaling – phishing targeted to financially “high gain” targets, such as C-Suite (CIO, CISO, CEO) employees.  This requires more research, for instance, coming from a common club at which they golf or lunch.</a:t>
+              <a:t>Whaling</a:t>
+            </a:r>
+            <a:r>
+              <a:rPr lang="en-US" sz="2400" b="0" i="0" u="none" strike="noStrike" cap="none" dirty="0">
+                <a:solidFill>
+                  <a:srgbClr val="2955A6"/>
+                </a:solidFill>
+                <a:latin typeface="Calibri"/>
+                <a:ea typeface="Calibri"/>
+                <a:cs typeface="Calibri"/>
+                <a:sym typeface="Calibri"/>
+              </a:rPr>
+              <a:t> – phishing targeted to financially “high gain” targets, such as C-Suite (CIO, CISO, CEO) employees.  This requires more research, for instance, coming from a common club at which they golf or lunch.</a:t>
             </a:r>
           </a:p>
           <a:p>
@@ -8256,7 +8616,7 @@
               <a:buChar char="•"/>
             </a:pPr>
             <a:r>
-              <a:rPr lang="en-US" sz="2400" b="0" i="0" u="none" strike="noStrike" cap="none">
+              <a:rPr lang="en-US" sz="2400" b="1" i="0" u="none" strike="noStrike" cap="none" dirty="0">
                 <a:solidFill>
                   <a:srgbClr val="2955A6"/>
                 </a:solidFill>
@@ -8265,7 +8625,19 @@
                 <a:cs typeface="Calibri"/>
                 <a:sym typeface="Calibri"/>
               </a:rPr>
-              <a:t>Vishing, or VoIP phishing – fraudulent phone calls, for instance from Microsoft tech support or the IRS, that trick the user into providing sensitive information, such as SSNs or credit card numbers.</a:t>
+              <a:t>Vishing</a:t>
+            </a:r>
+            <a:r>
+              <a:rPr lang="en-US" sz="2400" b="0" i="0" u="none" strike="noStrike" cap="none" dirty="0">
+                <a:solidFill>
+                  <a:srgbClr val="2955A6"/>
+                </a:solidFill>
+                <a:latin typeface="Calibri"/>
+                <a:ea typeface="Calibri"/>
+                <a:cs typeface="Calibri"/>
+                <a:sym typeface="Calibri"/>
+              </a:rPr>
+              <a:t>, or VoIP phishing – fraudulent phone calls, for instance from Microsoft tech support or the IRS, that trick the user into providing sensitive information, such as SSNs or credit card numbers.</a:t>
             </a:r>
           </a:p>
           <a:p>
@@ -8280,7 +8652,7 @@
               <a:buFont typeface="Arial"/>
               <a:buNone/>
             </a:pPr>
-            <a:endParaRPr sz="2800" b="0" i="0" u="none" strike="noStrike" cap="none">
+            <a:endParaRPr sz="2800" b="0" i="0" u="none" strike="noStrike" cap="none" dirty="0">
               <a:solidFill>
                 <a:srgbClr val="2955A6"/>
               </a:solidFill>
@@ -10040,7 +10412,7 @@
               <a:buChar char="•"/>
             </a:pPr>
             <a:r>
-              <a:rPr lang="en-US" sz="2400" b="0" i="0" u="none" strike="noStrike" cap="none">
+              <a:rPr lang="en-US" sz="2400" b="0" i="0" u="none" strike="noStrike" cap="none" dirty="0">
                 <a:solidFill>
                   <a:srgbClr val="2955A6"/>
                 </a:solidFill>
@@ -10068,7 +10440,7 @@
               <a:buChar char="•"/>
             </a:pPr>
             <a:r>
-              <a:rPr lang="en-US" sz="2400" b="0" i="0" u="none" strike="noStrike" cap="none">
+              <a:rPr lang="en-US" sz="2400" b="0" i="0" u="none" strike="noStrike" cap="none" dirty="0">
                 <a:solidFill>
                   <a:srgbClr val="2955A6"/>
                 </a:solidFill>
@@ -10077,7 +10449,7 @@
                 <a:cs typeface="Calibri"/>
                 <a:sym typeface="Calibri"/>
               </a:rPr>
-              <a:t>While there are different types of ransomware, some that just post bogus notices from the FBI on the computer, the more malicious strongly encrypt all files on the drive such that the user must purchase the key to decrypt the files.</a:t>
+              <a:t>Most ransomware encrypts all files on the drive such that the user must purchase the key to decrypt the files.</a:t>
             </a:r>
           </a:p>
           <a:p>
@@ -10085,6 +10457,9 @@
               <a:spcBef>
                 <a:spcPts val="480"/>
               </a:spcBef>
+              <a:spcAft>
+                <a:spcPts val="0"/>
+              </a:spcAft>
               <a:buClr>
                 <a:srgbClr val="2955A6"/>
               </a:buClr>
@@ -10093,7 +10468,7 @@
               <a:buChar char="•"/>
             </a:pPr>
             <a:r>
-              <a:rPr lang="en-US" sz="2400" b="0" i="0" u="none" strike="noStrike" cap="none">
+              <a:rPr lang="en-US" sz="2400" b="0" i="0" u="none" strike="noStrike" cap="none" dirty="0">
                 <a:solidFill>
                   <a:srgbClr val="2955A6"/>
                 </a:solidFill>
@@ -10102,7 +10477,32 @@
                 <a:cs typeface="Calibri"/>
                 <a:sym typeface="Calibri"/>
               </a:rPr>
-              <a:t>A new form of ransomware, doxware, is being circulated that also threatens to post the contents of the drive to the Internet if the victim doesn’t pay the extortion fee.</a:t>
+              <a:t>A </a:t>
+            </a:r>
+            <a:r>
+              <a:rPr lang="en-US" sz="2400" b="0" i="0" u="none" strike="noStrike" cap="none" dirty="0">
+                <a:solidFill>
+                  <a:srgbClr val="2955A6"/>
+                </a:solidFill>
+                <a:latin typeface="Calibri"/>
+                <a:ea typeface="Calibri"/>
+                <a:cs typeface="Calibri"/>
+                <a:sym typeface="Calibri"/>
+                <a:hlinkClick r:id="rId3"/>
+              </a:rPr>
+              <a:t>2025 Report </a:t>
+            </a:r>
+            <a:r>
+              <a:rPr lang="en-US" sz="2400" b="0" i="0" u="none" strike="noStrike" cap="none" dirty="0">
+                <a:solidFill>
+                  <a:srgbClr val="2955A6"/>
+                </a:solidFill>
+                <a:latin typeface="Calibri"/>
+                <a:ea typeface="Calibri"/>
+                <a:cs typeface="Calibri"/>
+                <a:sym typeface="Calibri"/>
+              </a:rPr>
+              <a:t>cites a 32% increase in reported attacks over 2024, as well as the average ransom demand more than doubling to nearly $1.2 million in 2025.</a:t>
             </a:r>
           </a:p>
         </p:txBody>

</xml_diff>